<commit_message>
updates in ppt and word file
</commit_message>
<xml_diff>
--- a/Leveraging Earth Observation Data for Informed Agricultural Decision-Making - Meteoric Minds.pptx
+++ b/Leveraging Earth Observation Data for Informed Agricultural Decision-Making - Meteoric Minds.pptx
@@ -11961,7 +11961,7 @@
         <p:spPr>
           <a:xfrm>
             <a:off x="989030" y="5638800"/>
-            <a:ext cx="10541000" cy="1077218"/>
+            <a:ext cx="10541000" cy="1107996"/>
           </a:xfrm>
           <a:prstGeom prst="rect">
             <a:avLst/>
@@ -11986,8 +11986,19 @@
             </a:pPr>
             <a:r>
               <a:rPr lang="en-US" sz="1600" dirty="0"/>
-              <a:t>Not published online, only on localhost</a:t>
+              <a:t>Not published online, only on localhost </a:t>
             </a:r>
+            <a:r>
+              <a:rPr lang="en-US" sz="1800" b="0" i="0" u="none" strike="noStrike" dirty="0">
+                <a:solidFill>
+                  <a:srgbClr val="000000"/>
+                </a:solidFill>
+                <a:effectLst/>
+                <a:latin typeface="Arial" panose="020B0604020202020204" pitchFamily="34" charset="0"/>
+              </a:rPr>
+              <a:t>and an error while displaying forecasted output.</a:t>
+            </a:r>
+            <a:endParaRPr lang="en-US" sz="1600" dirty="0"/>
           </a:p>
           <a:p>
             <a:pPr marL="285750" indent="-285750">
@@ -12006,15 +12017,7 @@
             </a:pPr>
             <a:r>
               <a:rPr lang="en-US" sz="1600" dirty="0"/>
-              <a:t>Change enter latitude, longitude, to select on map </a:t>
-            </a:r>
-            <a:r>
-              <a:rPr lang="en-US" sz="1600"/>
-              <a:t>which picks latitude and longitude as </a:t>
-            </a:r>
-            <a:r>
-              <a:rPr lang="en-US" sz="1600" dirty="0"/>
-              <a:t>input</a:t>
+              <a:t>Change enter latitude, longitude, to select on map which picks latitude and longitude as input</a:t>
             </a:r>
             <a:endParaRPr lang="en-IN" sz="1600" dirty="0"/>
           </a:p>

</xml_diff>